<commit_message>
gitignore changed. Typo in pptx fixed
</commit_message>
<xml_diff>
--- a/ChatQL.pptx
+++ b/ChatQL.pptx
@@ -49,8 +49,8 @@
         </p:nvSpPr>
         <p:spPr>
           <a:xfrm>
-            <a:off x="533520" y="764280"/>
-            <a:ext cx="6704640" cy="3771360"/>
+            <a:off x="216000" y="812520"/>
+            <a:ext cx="7127280" cy="4008960"/>
           </a:xfrm>
           <a:prstGeom prst="rect">
             <a:avLst/>
@@ -63,12 +63,12 @@
           <a:p>
             <a:pPr algn="ctr"/>
             <a:r>
-              <a:rPr b="0" lang="en-US" sz="4400" spc="-1" strike="noStrike">
+              <a:rPr b="0" lang="ru-RU" sz="4400" spc="-1" strike="noStrike">
                 <a:latin typeface="Arial"/>
               </a:rPr>
               <a:t>Click to move the slide</a:t>
             </a:r>
-            <a:endParaRPr b="0" lang="en-US" sz="4400" spc="-1" strike="noStrike">
+            <a:endParaRPr b="0" lang="ru-RU" sz="4400" spc="-1" strike="noStrike">
               <a:latin typeface="Arial"/>
             </a:endParaRPr>
           </a:p>
@@ -86,8 +86,8 @@
         </p:nvSpPr>
         <p:spPr>
           <a:xfrm>
-            <a:off x="777240" y="4777560"/>
-            <a:ext cx="6217560" cy="4525920"/>
+            <a:off x="756000" y="5078520"/>
+            <a:ext cx="6047640" cy="4811040"/>
           </a:xfrm>
           <a:prstGeom prst="rect">
             <a:avLst/>
@@ -99,12 +99,12 @@
           </a:bodyPr>
           <a:p>
             <a:r>
-              <a:rPr b="0" lang="en-US" sz="2000" spc="-1" strike="noStrike">
+              <a:rPr b="0" lang="ru-RU" sz="2000" spc="-1" strike="noStrike">
                 <a:latin typeface="Arial"/>
               </a:rPr>
               <a:t>Click to edit the notes format</a:t>
             </a:r>
-            <a:endParaRPr b="0" lang="en-US" sz="2000" spc="-1" strike="noStrike">
+            <a:endParaRPr b="0" lang="ru-RU" sz="2000" spc="-1" strike="noStrike">
               <a:latin typeface="Arial"/>
             </a:endParaRPr>
           </a:p>
@@ -123,7 +123,7 @@
         <p:spPr>
           <a:xfrm>
             <a:off x="0" y="0"/>
-            <a:ext cx="3372840" cy="502560"/>
+            <a:ext cx="3280680" cy="534240"/>
           </a:xfrm>
           <a:prstGeom prst="rect">
             <a:avLst/>
@@ -135,12 +135,12 @@
           </a:bodyPr>
           <a:p>
             <a:r>
-              <a:rPr b="0" lang="en-US" sz="1400" spc="-1" strike="noStrike">
+              <a:rPr b="0" lang="ru-RU" sz="1400" spc="-1" strike="noStrike">
                 <a:latin typeface="Times New Roman"/>
               </a:rPr>
               <a:t>&lt;header&gt;</a:t>
             </a:r>
-            <a:endParaRPr b="0" lang="en-US" sz="1400" spc="-1" strike="noStrike">
+            <a:endParaRPr b="0" lang="ru-RU" sz="1400" spc="-1" strike="noStrike">
               <a:latin typeface="Times New Roman"/>
             </a:endParaRPr>
           </a:p>
@@ -158,8 +158,8 @@
         </p:nvSpPr>
         <p:spPr>
           <a:xfrm>
-            <a:off x="4399200" y="0"/>
-            <a:ext cx="3372840" cy="502560"/>
+            <a:off x="4278960" y="0"/>
+            <a:ext cx="3280680" cy="534240"/>
           </a:xfrm>
           <a:prstGeom prst="rect">
             <a:avLst/>
@@ -172,12 +172,12 @@
           <a:p>
             <a:pPr algn="r"/>
             <a:r>
-              <a:rPr b="0" lang="en-US" sz="1400" spc="-1" strike="noStrike">
+              <a:rPr b="0" lang="ru-RU" sz="1400" spc="-1" strike="noStrike">
                 <a:latin typeface="Times New Roman"/>
               </a:rPr>
               <a:t>&lt;date/time&gt;</a:t>
             </a:r>
-            <a:endParaRPr b="0" lang="en-US" sz="1400" spc="-1" strike="noStrike">
+            <a:endParaRPr b="0" lang="ru-RU" sz="1400" spc="-1" strike="noStrike">
               <a:latin typeface="Times New Roman"/>
             </a:endParaRPr>
           </a:p>
@@ -195,8 +195,8 @@
         </p:nvSpPr>
         <p:spPr>
           <a:xfrm>
-            <a:off x="0" y="9555480"/>
-            <a:ext cx="3372840" cy="502560"/>
+            <a:off x="0" y="10157400"/>
+            <a:ext cx="3280680" cy="534240"/>
           </a:xfrm>
           <a:prstGeom prst="rect">
             <a:avLst/>
@@ -208,12 +208,12 @@
           </a:bodyPr>
           <a:p>
             <a:r>
-              <a:rPr b="0" lang="en-US" sz="1400" spc="-1" strike="noStrike">
+              <a:rPr b="0" lang="ru-RU" sz="1400" spc="-1" strike="noStrike">
                 <a:latin typeface="Times New Roman"/>
               </a:rPr>
               <a:t>&lt;footer&gt;</a:t>
             </a:r>
-            <a:endParaRPr b="0" lang="en-US" sz="1400" spc="-1" strike="noStrike">
+            <a:endParaRPr b="0" lang="ru-RU" sz="1400" spc="-1" strike="noStrike">
               <a:latin typeface="Times New Roman"/>
             </a:endParaRPr>
           </a:p>
@@ -231,8 +231,8 @@
         </p:nvSpPr>
         <p:spPr>
           <a:xfrm>
-            <a:off x="4399200" y="9555480"/>
-            <a:ext cx="3372840" cy="502560"/>
+            <a:off x="4278960" y="10157400"/>
+            <a:ext cx="3280680" cy="534240"/>
           </a:xfrm>
           <a:prstGeom prst="rect">
             <a:avLst/>
@@ -244,13 +244,13 @@
           </a:bodyPr>
           <a:p>
             <a:pPr algn="r"/>
-            <a:fld id="{4FE825F8-7693-424B-8449-7E3DA5A22F9C}" type="slidenum">
-              <a:rPr b="0" lang="en-US" sz="1400" spc="-1" strike="noStrike">
+            <a:fld id="{C2B30FF4-2995-48E2-BC08-37F96BB19CD6}" type="slidenum">
+              <a:rPr b="0" lang="ru-RU" sz="1400" spc="-1" strike="noStrike">
                 <a:latin typeface="Times New Roman"/>
               </a:rPr>
               <a:t>&lt;number&gt;</a:t>
             </a:fld>
-            <a:endParaRPr b="0" lang="en-US" sz="1400" spc="-1" strike="noStrike">
+            <a:endParaRPr b="0" lang="ru-RU" sz="1400" spc="-1" strike="noStrike">
               <a:latin typeface="Times New Roman"/>
             </a:endParaRPr>
           </a:p>
@@ -292,7 +292,7 @@
         <p:spPr>
           <a:xfrm>
             <a:off x="685800" y="1143000"/>
-            <a:ext cx="5485320" cy="3085200"/>
+            <a:ext cx="5484960" cy="3084840"/>
           </a:xfrm>
           <a:prstGeom prst="rect">
             <a:avLst/>
@@ -312,7 +312,7 @@
         <p:spPr>
           <a:xfrm>
             <a:off x="685800" y="4400640"/>
-            <a:ext cx="5485320" cy="3599280"/>
+            <a:ext cx="5484960" cy="3598920"/>
           </a:xfrm>
           <a:prstGeom prst="rect">
             <a:avLst/>
@@ -323,7 +323,7 @@
             <a:noAutofit/>
           </a:bodyPr>
           <a:p>
-            <a:endParaRPr b="0" lang="en-US" sz="2000" spc="-1" strike="noStrike">
+            <a:endParaRPr b="0" lang="ru-RU" sz="2000" spc="-1" strike="noStrike">
               <a:latin typeface="Arial"/>
             </a:endParaRPr>
           </a:p>
@@ -338,7 +338,7 @@
         <p:spPr>
           <a:xfrm>
             <a:off x="3884760" y="8685360"/>
-            <a:ext cx="2970720" cy="457560"/>
+            <a:ext cx="2970360" cy="457200"/>
           </a:xfrm>
           <a:prstGeom prst="rect">
             <a:avLst/>
@@ -364,7 +364,7 @@
                 <a:spcPct val="100000"/>
               </a:lnSpc>
             </a:pPr>
-            <a:fld id="{30DB73FE-D687-4690-9BA6-854D36ABADE0}" type="slidenum">
+            <a:fld id="{8956DE22-FE74-4BE0-A955-9C376668C17C}" type="slidenum">
               <a:rPr b="0" lang="ru-RU" sz="1200" spc="-1" strike="noStrike">
                 <a:solidFill>
                   <a:srgbClr val="000000"/>
@@ -373,7 +373,7 @@
               </a:rPr>
               <a:t>&lt;number&gt;</a:t>
             </a:fld>
-            <a:endParaRPr b="0" lang="en-US" sz="1200" spc="-1" strike="noStrike">
+            <a:endParaRPr b="0" lang="ru-RU" sz="1200" spc="-1" strike="noStrike">
               <a:latin typeface="Arial"/>
             </a:endParaRPr>
           </a:p>
@@ -448,7 +448,7 @@
           </a:bodyPr>
           <a:p>
             <a:pPr algn="ctr"/>
-            <a:endParaRPr b="0" lang="en-US" sz="4400" spc="-1" strike="noStrike">
+            <a:endParaRPr b="0" lang="ru-RU" sz="4400" spc="-1" strike="noStrike">
               <a:latin typeface="Arial"/>
             </a:endParaRPr>
           </a:p>
@@ -478,7 +478,7 @@
             <a:normAutofit/>
           </a:bodyPr>
           <a:p>
-            <a:endParaRPr b="0" lang="en-US" sz="3200" spc="-1" strike="noStrike">
+            <a:endParaRPr b="0" lang="ru-RU" sz="3200" spc="-1" strike="noStrike">
               <a:latin typeface="Arial"/>
             </a:endParaRPr>
           </a:p>
@@ -508,7 +508,7 @@
             <a:normAutofit/>
           </a:bodyPr>
           <a:p>
-            <a:endParaRPr b="0" lang="en-US" sz="3200" spc="-1" strike="noStrike">
+            <a:endParaRPr b="0" lang="ru-RU" sz="3200" spc="-1" strike="noStrike">
               <a:latin typeface="Arial"/>
             </a:endParaRPr>
           </a:p>
@@ -561,7 +561,7 @@
           </a:bodyPr>
           <a:p>
             <a:pPr algn="ctr"/>
-            <a:endParaRPr b="0" lang="en-US" sz="4400" spc="-1" strike="noStrike">
+            <a:endParaRPr b="0" lang="ru-RU" sz="4400" spc="-1" strike="noStrike">
               <a:latin typeface="Arial"/>
             </a:endParaRPr>
           </a:p>
@@ -591,7 +591,7 @@
             <a:normAutofit/>
           </a:bodyPr>
           <a:p>
-            <a:endParaRPr b="0" lang="en-US" sz="3200" spc="-1" strike="noStrike">
+            <a:endParaRPr b="0" lang="ru-RU" sz="3200" spc="-1" strike="noStrike">
               <a:latin typeface="Arial"/>
             </a:endParaRPr>
           </a:p>
@@ -621,7 +621,7 @@
             <a:normAutofit/>
           </a:bodyPr>
           <a:p>
-            <a:endParaRPr b="0" lang="en-US" sz="3200" spc="-1" strike="noStrike">
+            <a:endParaRPr b="0" lang="ru-RU" sz="3200" spc="-1" strike="noStrike">
               <a:latin typeface="Arial"/>
             </a:endParaRPr>
           </a:p>
@@ -651,7 +651,7 @@
             <a:normAutofit/>
           </a:bodyPr>
           <a:p>
-            <a:endParaRPr b="0" lang="en-US" sz="3200" spc="-1" strike="noStrike">
+            <a:endParaRPr b="0" lang="ru-RU" sz="3200" spc="-1" strike="noStrike">
               <a:latin typeface="Arial"/>
             </a:endParaRPr>
           </a:p>
@@ -681,7 +681,7 @@
             <a:normAutofit/>
           </a:bodyPr>
           <a:p>
-            <a:endParaRPr b="0" lang="en-US" sz="3200" spc="-1" strike="noStrike">
+            <a:endParaRPr b="0" lang="ru-RU" sz="3200" spc="-1" strike="noStrike">
               <a:latin typeface="Arial"/>
             </a:endParaRPr>
           </a:p>
@@ -734,7 +734,7 @@
           </a:bodyPr>
           <a:p>
             <a:pPr algn="ctr"/>
-            <a:endParaRPr b="0" lang="en-US" sz="4400" spc="-1" strike="noStrike">
+            <a:endParaRPr b="0" lang="ru-RU" sz="4400" spc="-1" strike="noStrike">
               <a:latin typeface="Arial"/>
             </a:endParaRPr>
           </a:p>
@@ -764,7 +764,7 @@
             <a:normAutofit/>
           </a:bodyPr>
           <a:p>
-            <a:endParaRPr b="0" lang="en-US" sz="3200" spc="-1" strike="noStrike">
+            <a:endParaRPr b="0" lang="ru-RU" sz="3200" spc="-1" strike="noStrike">
               <a:latin typeface="Arial"/>
             </a:endParaRPr>
           </a:p>
@@ -794,7 +794,7 @@
             <a:normAutofit/>
           </a:bodyPr>
           <a:p>
-            <a:endParaRPr b="0" lang="en-US" sz="3200" spc="-1" strike="noStrike">
+            <a:endParaRPr b="0" lang="ru-RU" sz="3200" spc="-1" strike="noStrike">
               <a:latin typeface="Arial"/>
             </a:endParaRPr>
           </a:p>
@@ -824,7 +824,7 @@
             <a:normAutofit/>
           </a:bodyPr>
           <a:p>
-            <a:endParaRPr b="0" lang="en-US" sz="3200" spc="-1" strike="noStrike">
+            <a:endParaRPr b="0" lang="ru-RU" sz="3200" spc="-1" strike="noStrike">
               <a:latin typeface="Arial"/>
             </a:endParaRPr>
           </a:p>
@@ -854,7 +854,7 @@
             <a:normAutofit/>
           </a:bodyPr>
           <a:p>
-            <a:endParaRPr b="0" lang="en-US" sz="3200" spc="-1" strike="noStrike">
+            <a:endParaRPr b="0" lang="ru-RU" sz="3200" spc="-1" strike="noStrike">
               <a:latin typeface="Arial"/>
             </a:endParaRPr>
           </a:p>
@@ -884,7 +884,7 @@
             <a:normAutofit/>
           </a:bodyPr>
           <a:p>
-            <a:endParaRPr b="0" lang="en-US" sz="3200" spc="-1" strike="noStrike">
+            <a:endParaRPr b="0" lang="ru-RU" sz="3200" spc="-1" strike="noStrike">
               <a:latin typeface="Arial"/>
             </a:endParaRPr>
           </a:p>
@@ -914,7 +914,7 @@
             <a:normAutofit/>
           </a:bodyPr>
           <a:p>
-            <a:endParaRPr b="0" lang="en-US" sz="3200" spc="-1" strike="noStrike">
+            <a:endParaRPr b="0" lang="ru-RU" sz="3200" spc="-1" strike="noStrike">
               <a:latin typeface="Arial"/>
             </a:endParaRPr>
           </a:p>
@@ -989,7 +989,7 @@
           </a:bodyPr>
           <a:p>
             <a:pPr algn="ctr"/>
-            <a:endParaRPr b="0" lang="en-US" sz="4400" spc="-1" strike="noStrike">
+            <a:endParaRPr b="0" lang="ru-RU" sz="4400" spc="-1" strike="noStrike">
               <a:latin typeface="Arial"/>
             </a:endParaRPr>
           </a:p>
@@ -1020,7 +1020,7 @@
           </a:bodyPr>
           <a:p>
             <a:pPr algn="ctr"/>
-            <a:endParaRPr b="0" lang="en-US" sz="3200" spc="-1" strike="noStrike">
+            <a:endParaRPr b="0" lang="ru-RU" sz="3200" spc="-1" strike="noStrike">
               <a:latin typeface="Arial"/>
             </a:endParaRPr>
           </a:p>
@@ -1073,7 +1073,7 @@
           </a:bodyPr>
           <a:p>
             <a:pPr algn="ctr"/>
-            <a:endParaRPr b="0" lang="en-US" sz="4400" spc="-1" strike="noStrike">
+            <a:endParaRPr b="0" lang="ru-RU" sz="4400" spc="-1" strike="noStrike">
               <a:latin typeface="Arial"/>
             </a:endParaRPr>
           </a:p>
@@ -1103,7 +1103,7 @@
             <a:normAutofit/>
           </a:bodyPr>
           <a:p>
-            <a:endParaRPr b="0" lang="en-US" sz="3200" spc="-1" strike="noStrike">
+            <a:endParaRPr b="0" lang="ru-RU" sz="3200" spc="-1" strike="noStrike">
               <a:latin typeface="Arial"/>
             </a:endParaRPr>
           </a:p>
@@ -1156,7 +1156,7 @@
           </a:bodyPr>
           <a:p>
             <a:pPr algn="ctr"/>
-            <a:endParaRPr b="0" lang="en-US" sz="4400" spc="-1" strike="noStrike">
+            <a:endParaRPr b="0" lang="ru-RU" sz="4400" spc="-1" strike="noStrike">
               <a:latin typeface="Arial"/>
             </a:endParaRPr>
           </a:p>
@@ -1186,7 +1186,7 @@
             <a:normAutofit/>
           </a:bodyPr>
           <a:p>
-            <a:endParaRPr b="0" lang="en-US" sz="3200" spc="-1" strike="noStrike">
+            <a:endParaRPr b="0" lang="ru-RU" sz="3200" spc="-1" strike="noStrike">
               <a:latin typeface="Arial"/>
             </a:endParaRPr>
           </a:p>
@@ -1216,7 +1216,7 @@
             <a:normAutofit/>
           </a:bodyPr>
           <a:p>
-            <a:endParaRPr b="0" lang="en-US" sz="3200" spc="-1" strike="noStrike">
+            <a:endParaRPr b="0" lang="ru-RU" sz="3200" spc="-1" strike="noStrike">
               <a:latin typeface="Arial"/>
             </a:endParaRPr>
           </a:p>
@@ -1269,7 +1269,7 @@
           </a:bodyPr>
           <a:p>
             <a:pPr algn="ctr"/>
-            <a:endParaRPr b="0" lang="en-US" sz="4400" spc="-1" strike="noStrike">
+            <a:endParaRPr b="0" lang="ru-RU" sz="4400" spc="-1" strike="noStrike">
               <a:latin typeface="Arial"/>
             </a:endParaRPr>
           </a:p>
@@ -1322,7 +1322,7 @@
           </a:bodyPr>
           <a:p>
             <a:pPr algn="ctr"/>
-            <a:endParaRPr b="0" lang="en-US" sz="3200" spc="-1" strike="noStrike">
+            <a:endParaRPr b="0" lang="ru-RU" sz="3200" spc="-1" strike="noStrike">
               <a:latin typeface="Arial"/>
             </a:endParaRPr>
           </a:p>
@@ -1375,7 +1375,7 @@
           </a:bodyPr>
           <a:p>
             <a:pPr algn="ctr"/>
-            <a:endParaRPr b="0" lang="en-US" sz="4400" spc="-1" strike="noStrike">
+            <a:endParaRPr b="0" lang="ru-RU" sz="4400" spc="-1" strike="noStrike">
               <a:latin typeface="Arial"/>
             </a:endParaRPr>
           </a:p>
@@ -1405,7 +1405,7 @@
             <a:normAutofit/>
           </a:bodyPr>
           <a:p>
-            <a:endParaRPr b="0" lang="en-US" sz="3200" spc="-1" strike="noStrike">
+            <a:endParaRPr b="0" lang="ru-RU" sz="3200" spc="-1" strike="noStrike">
               <a:latin typeface="Arial"/>
             </a:endParaRPr>
           </a:p>
@@ -1435,7 +1435,7 @@
             <a:normAutofit/>
           </a:bodyPr>
           <a:p>
-            <a:endParaRPr b="0" lang="en-US" sz="3200" spc="-1" strike="noStrike">
+            <a:endParaRPr b="0" lang="ru-RU" sz="3200" spc="-1" strike="noStrike">
               <a:latin typeface="Arial"/>
             </a:endParaRPr>
           </a:p>
@@ -1465,7 +1465,7 @@
             <a:normAutofit/>
           </a:bodyPr>
           <a:p>
-            <a:endParaRPr b="0" lang="en-US" sz="3200" spc="-1" strike="noStrike">
+            <a:endParaRPr b="0" lang="ru-RU" sz="3200" spc="-1" strike="noStrike">
               <a:latin typeface="Arial"/>
             </a:endParaRPr>
           </a:p>
@@ -1518,7 +1518,7 @@
           </a:bodyPr>
           <a:p>
             <a:pPr algn="ctr"/>
-            <a:endParaRPr b="0" lang="en-US" sz="4400" spc="-1" strike="noStrike">
+            <a:endParaRPr b="0" lang="ru-RU" sz="4400" spc="-1" strike="noStrike">
               <a:latin typeface="Arial"/>
             </a:endParaRPr>
           </a:p>
@@ -1549,7 +1549,7 @@
           </a:bodyPr>
           <a:p>
             <a:pPr algn="ctr"/>
-            <a:endParaRPr b="0" lang="en-US" sz="3200" spc="-1" strike="noStrike">
+            <a:endParaRPr b="0" lang="ru-RU" sz="3200" spc="-1" strike="noStrike">
               <a:latin typeface="Arial"/>
             </a:endParaRPr>
           </a:p>
@@ -1602,7 +1602,7 @@
           </a:bodyPr>
           <a:p>
             <a:pPr algn="ctr"/>
-            <a:endParaRPr b="0" lang="en-US" sz="4400" spc="-1" strike="noStrike">
+            <a:endParaRPr b="0" lang="ru-RU" sz="4400" spc="-1" strike="noStrike">
               <a:latin typeface="Arial"/>
             </a:endParaRPr>
           </a:p>
@@ -1632,7 +1632,7 @@
             <a:normAutofit/>
           </a:bodyPr>
           <a:p>
-            <a:endParaRPr b="0" lang="en-US" sz="3200" spc="-1" strike="noStrike">
+            <a:endParaRPr b="0" lang="ru-RU" sz="3200" spc="-1" strike="noStrike">
               <a:latin typeface="Arial"/>
             </a:endParaRPr>
           </a:p>
@@ -1662,7 +1662,7 @@
             <a:normAutofit/>
           </a:bodyPr>
           <a:p>
-            <a:endParaRPr b="0" lang="en-US" sz="3200" spc="-1" strike="noStrike">
+            <a:endParaRPr b="0" lang="ru-RU" sz="3200" spc="-1" strike="noStrike">
               <a:latin typeface="Arial"/>
             </a:endParaRPr>
           </a:p>
@@ -1692,7 +1692,7 @@
             <a:normAutofit/>
           </a:bodyPr>
           <a:p>
-            <a:endParaRPr b="0" lang="en-US" sz="3200" spc="-1" strike="noStrike">
+            <a:endParaRPr b="0" lang="ru-RU" sz="3200" spc="-1" strike="noStrike">
               <a:latin typeface="Arial"/>
             </a:endParaRPr>
           </a:p>
@@ -1745,7 +1745,7 @@
           </a:bodyPr>
           <a:p>
             <a:pPr algn="ctr"/>
-            <a:endParaRPr b="0" lang="en-US" sz="4400" spc="-1" strike="noStrike">
+            <a:endParaRPr b="0" lang="ru-RU" sz="4400" spc="-1" strike="noStrike">
               <a:latin typeface="Arial"/>
             </a:endParaRPr>
           </a:p>
@@ -1775,7 +1775,7 @@
             <a:normAutofit/>
           </a:bodyPr>
           <a:p>
-            <a:endParaRPr b="0" lang="en-US" sz="3200" spc="-1" strike="noStrike">
+            <a:endParaRPr b="0" lang="ru-RU" sz="3200" spc="-1" strike="noStrike">
               <a:latin typeface="Arial"/>
             </a:endParaRPr>
           </a:p>
@@ -1805,7 +1805,7 @@
             <a:normAutofit/>
           </a:bodyPr>
           <a:p>
-            <a:endParaRPr b="0" lang="en-US" sz="3200" spc="-1" strike="noStrike">
+            <a:endParaRPr b="0" lang="ru-RU" sz="3200" spc="-1" strike="noStrike">
               <a:latin typeface="Arial"/>
             </a:endParaRPr>
           </a:p>
@@ -1835,7 +1835,7 @@
             <a:normAutofit/>
           </a:bodyPr>
           <a:p>
-            <a:endParaRPr b="0" lang="en-US" sz="3200" spc="-1" strike="noStrike">
+            <a:endParaRPr b="0" lang="ru-RU" sz="3200" spc="-1" strike="noStrike">
               <a:latin typeface="Arial"/>
             </a:endParaRPr>
           </a:p>
@@ -1888,7 +1888,7 @@
           </a:bodyPr>
           <a:p>
             <a:pPr algn="ctr"/>
-            <a:endParaRPr b="0" lang="en-US" sz="4400" spc="-1" strike="noStrike">
+            <a:endParaRPr b="0" lang="ru-RU" sz="4400" spc="-1" strike="noStrike">
               <a:latin typeface="Arial"/>
             </a:endParaRPr>
           </a:p>
@@ -1918,7 +1918,7 @@
             <a:normAutofit/>
           </a:bodyPr>
           <a:p>
-            <a:endParaRPr b="0" lang="en-US" sz="3200" spc="-1" strike="noStrike">
+            <a:endParaRPr b="0" lang="ru-RU" sz="3200" spc="-1" strike="noStrike">
               <a:latin typeface="Arial"/>
             </a:endParaRPr>
           </a:p>
@@ -1948,7 +1948,7 @@
             <a:normAutofit/>
           </a:bodyPr>
           <a:p>
-            <a:endParaRPr b="0" lang="en-US" sz="3200" spc="-1" strike="noStrike">
+            <a:endParaRPr b="0" lang="ru-RU" sz="3200" spc="-1" strike="noStrike">
               <a:latin typeface="Arial"/>
             </a:endParaRPr>
           </a:p>
@@ -2001,7 +2001,7 @@
           </a:bodyPr>
           <a:p>
             <a:pPr algn="ctr"/>
-            <a:endParaRPr b="0" lang="en-US" sz="4400" spc="-1" strike="noStrike">
+            <a:endParaRPr b="0" lang="ru-RU" sz="4400" spc="-1" strike="noStrike">
               <a:latin typeface="Arial"/>
             </a:endParaRPr>
           </a:p>
@@ -2031,7 +2031,7 @@
             <a:normAutofit/>
           </a:bodyPr>
           <a:p>
-            <a:endParaRPr b="0" lang="en-US" sz="3200" spc="-1" strike="noStrike">
+            <a:endParaRPr b="0" lang="ru-RU" sz="3200" spc="-1" strike="noStrike">
               <a:latin typeface="Arial"/>
             </a:endParaRPr>
           </a:p>
@@ -2061,7 +2061,7 @@
             <a:normAutofit/>
           </a:bodyPr>
           <a:p>
-            <a:endParaRPr b="0" lang="en-US" sz="3200" spc="-1" strike="noStrike">
+            <a:endParaRPr b="0" lang="ru-RU" sz="3200" spc="-1" strike="noStrike">
               <a:latin typeface="Arial"/>
             </a:endParaRPr>
           </a:p>
@@ -2091,7 +2091,7 @@
             <a:normAutofit/>
           </a:bodyPr>
           <a:p>
-            <a:endParaRPr b="0" lang="en-US" sz="3200" spc="-1" strike="noStrike">
+            <a:endParaRPr b="0" lang="ru-RU" sz="3200" spc="-1" strike="noStrike">
               <a:latin typeface="Arial"/>
             </a:endParaRPr>
           </a:p>
@@ -2121,7 +2121,7 @@
             <a:normAutofit/>
           </a:bodyPr>
           <a:p>
-            <a:endParaRPr b="0" lang="en-US" sz="3200" spc="-1" strike="noStrike">
+            <a:endParaRPr b="0" lang="ru-RU" sz="3200" spc="-1" strike="noStrike">
               <a:latin typeface="Arial"/>
             </a:endParaRPr>
           </a:p>
@@ -2174,7 +2174,7 @@
           </a:bodyPr>
           <a:p>
             <a:pPr algn="ctr"/>
-            <a:endParaRPr b="0" lang="en-US" sz="4400" spc="-1" strike="noStrike">
+            <a:endParaRPr b="0" lang="ru-RU" sz="4400" spc="-1" strike="noStrike">
               <a:latin typeface="Arial"/>
             </a:endParaRPr>
           </a:p>
@@ -2204,7 +2204,7 @@
             <a:normAutofit/>
           </a:bodyPr>
           <a:p>
-            <a:endParaRPr b="0" lang="en-US" sz="3200" spc="-1" strike="noStrike">
+            <a:endParaRPr b="0" lang="ru-RU" sz="3200" spc="-1" strike="noStrike">
               <a:latin typeface="Arial"/>
             </a:endParaRPr>
           </a:p>
@@ -2234,7 +2234,7 @@
             <a:normAutofit/>
           </a:bodyPr>
           <a:p>
-            <a:endParaRPr b="0" lang="en-US" sz="3200" spc="-1" strike="noStrike">
+            <a:endParaRPr b="0" lang="ru-RU" sz="3200" spc="-1" strike="noStrike">
               <a:latin typeface="Arial"/>
             </a:endParaRPr>
           </a:p>
@@ -2264,7 +2264,7 @@
             <a:normAutofit/>
           </a:bodyPr>
           <a:p>
-            <a:endParaRPr b="0" lang="en-US" sz="3200" spc="-1" strike="noStrike">
+            <a:endParaRPr b="0" lang="ru-RU" sz="3200" spc="-1" strike="noStrike">
               <a:latin typeface="Arial"/>
             </a:endParaRPr>
           </a:p>
@@ -2294,7 +2294,7 @@
             <a:normAutofit/>
           </a:bodyPr>
           <a:p>
-            <a:endParaRPr b="0" lang="en-US" sz="3200" spc="-1" strike="noStrike">
+            <a:endParaRPr b="0" lang="ru-RU" sz="3200" spc="-1" strike="noStrike">
               <a:latin typeface="Arial"/>
             </a:endParaRPr>
           </a:p>
@@ -2324,7 +2324,7 @@
             <a:normAutofit/>
           </a:bodyPr>
           <a:p>
-            <a:endParaRPr b="0" lang="en-US" sz="3200" spc="-1" strike="noStrike">
+            <a:endParaRPr b="0" lang="ru-RU" sz="3200" spc="-1" strike="noStrike">
               <a:latin typeface="Arial"/>
             </a:endParaRPr>
           </a:p>
@@ -2354,7 +2354,7 @@
             <a:normAutofit/>
           </a:bodyPr>
           <a:p>
-            <a:endParaRPr b="0" lang="en-US" sz="3200" spc="-1" strike="noStrike">
+            <a:endParaRPr b="0" lang="ru-RU" sz="3200" spc="-1" strike="noStrike">
               <a:latin typeface="Arial"/>
             </a:endParaRPr>
           </a:p>
@@ -2407,7 +2407,7 @@
           </a:bodyPr>
           <a:p>
             <a:pPr algn="ctr"/>
-            <a:endParaRPr b="0" lang="en-US" sz="4400" spc="-1" strike="noStrike">
+            <a:endParaRPr b="0" lang="ru-RU" sz="4400" spc="-1" strike="noStrike">
               <a:latin typeface="Arial"/>
             </a:endParaRPr>
           </a:p>
@@ -2437,7 +2437,7 @@
             <a:normAutofit/>
           </a:bodyPr>
           <a:p>
-            <a:endParaRPr b="0" lang="en-US" sz="3200" spc="-1" strike="noStrike">
+            <a:endParaRPr b="0" lang="ru-RU" sz="3200" spc="-1" strike="noStrike">
               <a:latin typeface="Arial"/>
             </a:endParaRPr>
           </a:p>
@@ -2490,7 +2490,7 @@
           </a:bodyPr>
           <a:p>
             <a:pPr algn="ctr"/>
-            <a:endParaRPr b="0" lang="en-US" sz="4400" spc="-1" strike="noStrike">
+            <a:endParaRPr b="0" lang="ru-RU" sz="4400" spc="-1" strike="noStrike">
               <a:latin typeface="Arial"/>
             </a:endParaRPr>
           </a:p>
@@ -2520,7 +2520,7 @@
             <a:normAutofit/>
           </a:bodyPr>
           <a:p>
-            <a:endParaRPr b="0" lang="en-US" sz="3200" spc="-1" strike="noStrike">
+            <a:endParaRPr b="0" lang="ru-RU" sz="3200" spc="-1" strike="noStrike">
               <a:latin typeface="Arial"/>
             </a:endParaRPr>
           </a:p>
@@ -2550,7 +2550,7 @@
             <a:normAutofit/>
           </a:bodyPr>
           <a:p>
-            <a:endParaRPr b="0" lang="en-US" sz="3200" spc="-1" strike="noStrike">
+            <a:endParaRPr b="0" lang="ru-RU" sz="3200" spc="-1" strike="noStrike">
               <a:latin typeface="Arial"/>
             </a:endParaRPr>
           </a:p>
@@ -2603,7 +2603,7 @@
           </a:bodyPr>
           <a:p>
             <a:pPr algn="ctr"/>
-            <a:endParaRPr b="0" lang="en-US" sz="4400" spc="-1" strike="noStrike">
+            <a:endParaRPr b="0" lang="ru-RU" sz="4400" spc="-1" strike="noStrike">
               <a:latin typeface="Arial"/>
             </a:endParaRPr>
           </a:p>
@@ -2656,7 +2656,7 @@
           </a:bodyPr>
           <a:p>
             <a:pPr algn="ctr"/>
-            <a:endParaRPr b="0" lang="en-US" sz="3200" spc="-1" strike="noStrike">
+            <a:endParaRPr b="0" lang="ru-RU" sz="3200" spc="-1" strike="noStrike">
               <a:latin typeface="Arial"/>
             </a:endParaRPr>
           </a:p>
@@ -2709,7 +2709,7 @@
           </a:bodyPr>
           <a:p>
             <a:pPr algn="ctr"/>
-            <a:endParaRPr b="0" lang="en-US" sz="4400" spc="-1" strike="noStrike">
+            <a:endParaRPr b="0" lang="ru-RU" sz="4400" spc="-1" strike="noStrike">
               <a:latin typeface="Arial"/>
             </a:endParaRPr>
           </a:p>
@@ -2739,7 +2739,7 @@
             <a:normAutofit/>
           </a:bodyPr>
           <a:p>
-            <a:endParaRPr b="0" lang="en-US" sz="3200" spc="-1" strike="noStrike">
+            <a:endParaRPr b="0" lang="ru-RU" sz="3200" spc="-1" strike="noStrike">
               <a:latin typeface="Arial"/>
             </a:endParaRPr>
           </a:p>
@@ -2769,7 +2769,7 @@
             <a:normAutofit/>
           </a:bodyPr>
           <a:p>
-            <a:endParaRPr b="0" lang="en-US" sz="3200" spc="-1" strike="noStrike">
+            <a:endParaRPr b="0" lang="ru-RU" sz="3200" spc="-1" strike="noStrike">
               <a:latin typeface="Arial"/>
             </a:endParaRPr>
           </a:p>
@@ -2799,7 +2799,7 @@
             <a:normAutofit/>
           </a:bodyPr>
           <a:p>
-            <a:endParaRPr b="0" lang="en-US" sz="3200" spc="-1" strike="noStrike">
+            <a:endParaRPr b="0" lang="ru-RU" sz="3200" spc="-1" strike="noStrike">
               <a:latin typeface="Arial"/>
             </a:endParaRPr>
           </a:p>
@@ -2852,7 +2852,7 @@
           </a:bodyPr>
           <a:p>
             <a:pPr algn="ctr"/>
-            <a:endParaRPr b="0" lang="en-US" sz="4400" spc="-1" strike="noStrike">
+            <a:endParaRPr b="0" lang="ru-RU" sz="4400" spc="-1" strike="noStrike">
               <a:latin typeface="Arial"/>
             </a:endParaRPr>
           </a:p>
@@ -2882,7 +2882,7 @@
             <a:normAutofit/>
           </a:bodyPr>
           <a:p>
-            <a:endParaRPr b="0" lang="en-US" sz="3200" spc="-1" strike="noStrike">
+            <a:endParaRPr b="0" lang="ru-RU" sz="3200" spc="-1" strike="noStrike">
               <a:latin typeface="Arial"/>
             </a:endParaRPr>
           </a:p>
@@ -2912,7 +2912,7 @@
             <a:normAutofit/>
           </a:bodyPr>
           <a:p>
-            <a:endParaRPr b="0" lang="en-US" sz="3200" spc="-1" strike="noStrike">
+            <a:endParaRPr b="0" lang="ru-RU" sz="3200" spc="-1" strike="noStrike">
               <a:latin typeface="Arial"/>
             </a:endParaRPr>
           </a:p>
@@ -2942,7 +2942,7 @@
             <a:normAutofit/>
           </a:bodyPr>
           <a:p>
-            <a:endParaRPr b="0" lang="en-US" sz="3200" spc="-1" strike="noStrike">
+            <a:endParaRPr b="0" lang="ru-RU" sz="3200" spc="-1" strike="noStrike">
               <a:latin typeface="Arial"/>
             </a:endParaRPr>
           </a:p>
@@ -2995,7 +2995,7 @@
           </a:bodyPr>
           <a:p>
             <a:pPr algn="ctr"/>
-            <a:endParaRPr b="0" lang="en-US" sz="4400" spc="-1" strike="noStrike">
+            <a:endParaRPr b="0" lang="ru-RU" sz="4400" spc="-1" strike="noStrike">
               <a:latin typeface="Arial"/>
             </a:endParaRPr>
           </a:p>
@@ -3025,7 +3025,7 @@
             <a:normAutofit/>
           </a:bodyPr>
           <a:p>
-            <a:endParaRPr b="0" lang="en-US" sz="3200" spc="-1" strike="noStrike">
+            <a:endParaRPr b="0" lang="ru-RU" sz="3200" spc="-1" strike="noStrike">
               <a:latin typeface="Arial"/>
             </a:endParaRPr>
           </a:p>
@@ -3055,7 +3055,7 @@
             <a:normAutofit/>
           </a:bodyPr>
           <a:p>
-            <a:endParaRPr b="0" lang="en-US" sz="3200" spc="-1" strike="noStrike">
+            <a:endParaRPr b="0" lang="ru-RU" sz="3200" spc="-1" strike="noStrike">
               <a:latin typeface="Arial"/>
             </a:endParaRPr>
           </a:p>
@@ -3085,7 +3085,7 @@
             <a:normAutofit/>
           </a:bodyPr>
           <a:p>
-            <a:endParaRPr b="0" lang="en-US" sz="3200" spc="-1" strike="noStrike">
+            <a:endParaRPr b="0" lang="ru-RU" sz="3200" spc="-1" strike="noStrike">
               <a:latin typeface="Arial"/>
             </a:endParaRPr>
           </a:p>
@@ -3134,7 +3134,7 @@
         <p:spPr>
           <a:xfrm>
             <a:off x="0" y="0"/>
-            <a:ext cx="9487080" cy="5053320"/>
+            <a:ext cx="9486720" cy="5052960"/>
           </a:xfrm>
           <a:prstGeom prst="rect">
             <a:avLst/>
@@ -3157,7 +3157,7 @@
         <p:spPr>
           <a:xfrm>
             <a:off x="609480" y="273600"/>
-            <a:ext cx="10972080" cy="1144440"/>
+            <a:ext cx="10972440" cy="1144800"/>
           </a:xfrm>
           <a:prstGeom prst="rect">
             <a:avLst/>
@@ -3168,13 +3168,14 @@
             <a:noAutofit/>
           </a:bodyPr>
           <a:p>
+            <a:pPr algn="ctr"/>
             <a:r>
-              <a:rPr b="0" lang="en-US" sz="1800" spc="-1" strike="noStrike">
+              <a:rPr b="0" lang="ru-RU" sz="4400" spc="-1" strike="noStrike">
                 <a:latin typeface="Arial"/>
               </a:rPr>
               <a:t>Click to edit the title text format</a:t>
             </a:r>
-            <a:endParaRPr b="0" lang="en-US" sz="1800" spc="-1" strike="noStrike">
+            <a:endParaRPr b="0" lang="ru-RU" sz="4400" spc="-1" strike="noStrike">
               <a:latin typeface="Arial"/>
             </a:endParaRPr>
           </a:p>
@@ -3193,7 +3194,7 @@
         <p:spPr>
           <a:xfrm>
             <a:off x="609480" y="1604520"/>
-            <a:ext cx="10972080" cy="3976920"/>
+            <a:ext cx="10972440" cy="3977280"/>
           </a:xfrm>
           <a:prstGeom prst="rect">
             <a:avLst/>
@@ -3216,12 +3217,12 @@
               <a:buChar char=""/>
             </a:pPr>
             <a:r>
-              <a:rPr b="0" lang="en-US" sz="1800" spc="-1" strike="noStrike">
+              <a:rPr b="0" lang="ru-RU" sz="3200" spc="-1" strike="noStrike">
                 <a:latin typeface="Arial"/>
               </a:rPr>
               <a:t>Click to edit the outline text format</a:t>
             </a:r>
-            <a:endParaRPr b="0" lang="en-US" sz="1800" spc="-1" strike="noStrike">
+            <a:endParaRPr b="0" lang="ru-RU" sz="3200" spc="-1" strike="noStrike">
               <a:latin typeface="Arial"/>
             </a:endParaRPr>
           </a:p>
@@ -3238,12 +3239,12 @@
               <a:buChar char=""/>
             </a:pPr>
             <a:r>
-              <a:rPr b="0" lang="en-US" sz="1800" spc="-1" strike="noStrike">
+              <a:rPr b="0" lang="ru-RU" sz="2800" spc="-1" strike="noStrike">
                 <a:latin typeface="Arial"/>
               </a:rPr>
               <a:t>Second Outline Level</a:t>
             </a:r>
-            <a:endParaRPr b="0" lang="en-US" sz="1800" spc="-1" strike="noStrike">
+            <a:endParaRPr b="0" lang="ru-RU" sz="2800" spc="-1" strike="noStrike">
               <a:latin typeface="Arial"/>
             </a:endParaRPr>
           </a:p>
@@ -3260,12 +3261,12 @@
               <a:buChar char=""/>
             </a:pPr>
             <a:r>
-              <a:rPr b="0" lang="en-US" sz="1800" spc="-1" strike="noStrike">
+              <a:rPr b="0" lang="ru-RU" sz="2400" spc="-1" strike="noStrike">
                 <a:latin typeface="Arial"/>
               </a:rPr>
               <a:t>Third Outline Level</a:t>
             </a:r>
-            <a:endParaRPr b="0" lang="en-US" sz="1800" spc="-1" strike="noStrike">
+            <a:endParaRPr b="0" lang="ru-RU" sz="2400" spc="-1" strike="noStrike">
               <a:latin typeface="Arial"/>
             </a:endParaRPr>
           </a:p>
@@ -3282,12 +3283,12 @@
               <a:buChar char=""/>
             </a:pPr>
             <a:r>
-              <a:rPr b="0" lang="en-US" sz="1800" spc="-1" strike="noStrike">
+              <a:rPr b="0" lang="ru-RU" sz="2000" spc="-1" strike="noStrike">
                 <a:latin typeface="Arial"/>
               </a:rPr>
               <a:t>Fourth Outline Level</a:t>
             </a:r>
-            <a:endParaRPr b="0" lang="en-US" sz="1800" spc="-1" strike="noStrike">
+            <a:endParaRPr b="0" lang="ru-RU" sz="2000" spc="-1" strike="noStrike">
               <a:latin typeface="Arial"/>
             </a:endParaRPr>
           </a:p>
@@ -3304,12 +3305,12 @@
               <a:buChar char=""/>
             </a:pPr>
             <a:r>
-              <a:rPr b="0" lang="en-US" sz="1800" spc="-1" strike="noStrike">
+              <a:rPr b="0" lang="ru-RU" sz="2000" spc="-1" strike="noStrike">
                 <a:latin typeface="Arial"/>
               </a:rPr>
               <a:t>Fifth Outline Level</a:t>
             </a:r>
-            <a:endParaRPr b="0" lang="en-US" sz="1800" spc="-1" strike="noStrike">
+            <a:endParaRPr b="0" lang="ru-RU" sz="2000" spc="-1" strike="noStrike">
               <a:latin typeface="Arial"/>
             </a:endParaRPr>
           </a:p>
@@ -3326,12 +3327,12 @@
               <a:buChar char=""/>
             </a:pPr>
             <a:r>
-              <a:rPr b="0" lang="en-US" sz="1800" spc="-1" strike="noStrike">
+              <a:rPr b="0" lang="ru-RU" sz="2000" spc="-1" strike="noStrike">
                 <a:latin typeface="Arial"/>
               </a:rPr>
               <a:t>Sixth Outline Level</a:t>
             </a:r>
-            <a:endParaRPr b="0" lang="en-US" sz="1800" spc="-1" strike="noStrike">
+            <a:endParaRPr b="0" lang="ru-RU" sz="2000" spc="-1" strike="noStrike">
               <a:latin typeface="Arial"/>
             </a:endParaRPr>
           </a:p>
@@ -3348,12 +3349,12 @@
               <a:buChar char=""/>
             </a:pPr>
             <a:r>
-              <a:rPr b="0" lang="en-US" sz="1800" spc="-1" strike="noStrike">
+              <a:rPr b="0" lang="ru-RU" sz="2000" spc="-1" strike="noStrike">
                 <a:latin typeface="Arial"/>
               </a:rPr>
               <a:t>Seventh Outline Level</a:t>
             </a:r>
-            <a:endParaRPr b="0" lang="en-US" sz="1800" spc="-1" strike="noStrike">
+            <a:endParaRPr b="0" lang="ru-RU" sz="2000" spc="-1" strike="noStrike">
               <a:latin typeface="Arial"/>
             </a:endParaRPr>
           </a:p>
@@ -3417,7 +3418,7 @@
         <p:spPr>
           <a:xfrm>
             <a:off x="5488920" y="0"/>
-            <a:ext cx="6702120" cy="6856920"/>
+            <a:ext cx="6701760" cy="6856560"/>
           </a:xfrm>
           <a:prstGeom prst="rect">
             <a:avLst/>
@@ -3453,12 +3454,12 @@
           <a:p>
             <a:pPr algn="ctr"/>
             <a:r>
-              <a:rPr b="0" lang="en-US" sz="4400" spc="-1" strike="noStrike">
+              <a:rPr b="0" lang="ru-RU" sz="4400" spc="-1" strike="noStrike">
                 <a:latin typeface="Arial"/>
               </a:rPr>
               <a:t>Click to edit the title text format</a:t>
             </a:r>
-            <a:endParaRPr b="0" lang="en-US" sz="4400" spc="-1" strike="noStrike">
+            <a:endParaRPr b="0" lang="ru-RU" sz="4400" spc="-1" strike="noStrike">
               <a:latin typeface="Arial"/>
             </a:endParaRPr>
           </a:p>
@@ -3500,12 +3501,12 @@
               <a:buChar char=""/>
             </a:pPr>
             <a:r>
-              <a:rPr b="0" lang="en-US" sz="3200" spc="-1" strike="noStrike">
+              <a:rPr b="0" lang="ru-RU" sz="3200" spc="-1" strike="noStrike">
                 <a:latin typeface="Arial"/>
               </a:rPr>
               <a:t>Click to edit the outline text format</a:t>
             </a:r>
-            <a:endParaRPr b="0" lang="en-US" sz="3200" spc="-1" strike="noStrike">
+            <a:endParaRPr b="0" lang="ru-RU" sz="3200" spc="-1" strike="noStrike">
               <a:latin typeface="Arial"/>
             </a:endParaRPr>
           </a:p>
@@ -3522,12 +3523,12 @@
               <a:buChar char=""/>
             </a:pPr>
             <a:r>
-              <a:rPr b="0" lang="en-US" sz="2800" spc="-1" strike="noStrike">
+              <a:rPr b="0" lang="ru-RU" sz="2800" spc="-1" strike="noStrike">
                 <a:latin typeface="Arial"/>
               </a:rPr>
               <a:t>Second Outline Level</a:t>
             </a:r>
-            <a:endParaRPr b="0" lang="en-US" sz="2800" spc="-1" strike="noStrike">
+            <a:endParaRPr b="0" lang="ru-RU" sz="2800" spc="-1" strike="noStrike">
               <a:latin typeface="Arial"/>
             </a:endParaRPr>
           </a:p>
@@ -3544,12 +3545,12 @@
               <a:buChar char=""/>
             </a:pPr>
             <a:r>
-              <a:rPr b="0" lang="en-US" sz="2400" spc="-1" strike="noStrike">
+              <a:rPr b="0" lang="ru-RU" sz="2400" spc="-1" strike="noStrike">
                 <a:latin typeface="Arial"/>
               </a:rPr>
               <a:t>Third Outline Level</a:t>
             </a:r>
-            <a:endParaRPr b="0" lang="en-US" sz="2400" spc="-1" strike="noStrike">
+            <a:endParaRPr b="0" lang="ru-RU" sz="2400" spc="-1" strike="noStrike">
               <a:latin typeface="Arial"/>
             </a:endParaRPr>
           </a:p>
@@ -3566,12 +3567,12 @@
               <a:buChar char=""/>
             </a:pPr>
             <a:r>
-              <a:rPr b="0" lang="en-US" sz="2000" spc="-1" strike="noStrike">
+              <a:rPr b="0" lang="ru-RU" sz="2000" spc="-1" strike="noStrike">
                 <a:latin typeface="Arial"/>
               </a:rPr>
               <a:t>Fourth Outline Level</a:t>
             </a:r>
-            <a:endParaRPr b="0" lang="en-US" sz="2000" spc="-1" strike="noStrike">
+            <a:endParaRPr b="0" lang="ru-RU" sz="2000" spc="-1" strike="noStrike">
               <a:latin typeface="Arial"/>
             </a:endParaRPr>
           </a:p>
@@ -3588,12 +3589,12 @@
               <a:buChar char=""/>
             </a:pPr>
             <a:r>
-              <a:rPr b="0" lang="en-US" sz="2000" spc="-1" strike="noStrike">
+              <a:rPr b="0" lang="ru-RU" sz="2000" spc="-1" strike="noStrike">
                 <a:latin typeface="Arial"/>
               </a:rPr>
               <a:t>Fifth Outline Level</a:t>
             </a:r>
-            <a:endParaRPr b="0" lang="en-US" sz="2000" spc="-1" strike="noStrike">
+            <a:endParaRPr b="0" lang="ru-RU" sz="2000" spc="-1" strike="noStrike">
               <a:latin typeface="Arial"/>
             </a:endParaRPr>
           </a:p>
@@ -3610,12 +3611,12 @@
               <a:buChar char=""/>
             </a:pPr>
             <a:r>
-              <a:rPr b="0" lang="en-US" sz="2000" spc="-1" strike="noStrike">
+              <a:rPr b="0" lang="ru-RU" sz="2000" spc="-1" strike="noStrike">
                 <a:latin typeface="Arial"/>
               </a:rPr>
               <a:t>Sixth Outline Level</a:t>
             </a:r>
-            <a:endParaRPr b="0" lang="en-US" sz="2000" spc="-1" strike="noStrike">
+            <a:endParaRPr b="0" lang="ru-RU" sz="2000" spc="-1" strike="noStrike">
               <a:latin typeface="Arial"/>
             </a:endParaRPr>
           </a:p>
@@ -3632,12 +3633,12 @@
               <a:buChar char=""/>
             </a:pPr>
             <a:r>
-              <a:rPr b="0" lang="en-US" sz="2000" spc="-1" strike="noStrike">
+              <a:rPr b="0" lang="ru-RU" sz="2000" spc="-1" strike="noStrike">
                 <a:latin typeface="Arial"/>
               </a:rPr>
               <a:t>Seventh Outline Level</a:t>
             </a:r>
-            <a:endParaRPr b="0" lang="en-US" sz="2000" spc="-1" strike="noStrike">
+            <a:endParaRPr b="0" lang="ru-RU" sz="2000" spc="-1" strike="noStrike">
               <a:latin typeface="Arial"/>
             </a:endParaRPr>
           </a:p>
@@ -3689,7 +3690,7 @@
         <p:spPr>
           <a:xfrm>
             <a:off x="6569280" y="5586840"/>
-            <a:ext cx="4940640" cy="395640"/>
+            <a:ext cx="4940280" cy="395280"/>
           </a:xfrm>
           <a:prstGeom prst="rect">
             <a:avLst/>
@@ -3731,7 +3732,7 @@
               </a:rPr>
               <a:t>Коржаневский К., гр 19352.</a:t>
             </a:r>
-            <a:endParaRPr b="0" lang="en-US" sz="1600" spc="-1" strike="noStrike">
+            <a:endParaRPr b="0" lang="ru-RU" sz="1600" spc="-1" strike="noStrike">
               <a:latin typeface="Arial"/>
             </a:endParaRPr>
           </a:p>
@@ -3747,7 +3748,7 @@
                 <a:tab algn="l" pos="0"/>
               </a:tabLst>
             </a:pPr>
-            <a:endParaRPr b="0" lang="en-US" sz="1600" spc="-1" strike="noStrike">
+            <a:endParaRPr b="0" lang="ru-RU" sz="1600" spc="-1" strike="noStrike">
               <a:latin typeface="Arial"/>
             </a:endParaRPr>
           </a:p>
@@ -3762,7 +3763,7 @@
         <p:spPr>
           <a:xfrm>
             <a:off x="6542280" y="4577760"/>
-            <a:ext cx="4694760" cy="912600"/>
+            <a:ext cx="4694400" cy="912600"/>
           </a:xfrm>
           <a:prstGeom prst="rect">
             <a:avLst/>
@@ -3818,7 +3819,7 @@
               </a:rPr>
               <a:t> </a:t>
             </a:r>
-            <a:endParaRPr b="0" lang="en-US" sz="1800" spc="-1" strike="noStrike">
+            <a:endParaRPr b="0" lang="ru-RU" sz="1800" spc="-1" strike="noStrike">
               <a:latin typeface="Arial"/>
             </a:endParaRPr>
           </a:p>
@@ -3863,7 +3864,7 @@
         <p:spPr>
           <a:xfrm>
             <a:off x="5536440" y="6356520"/>
-            <a:ext cx="986400" cy="363960"/>
+            <a:ext cx="986040" cy="363600"/>
           </a:xfrm>
           <a:prstGeom prst="rect">
             <a:avLst/>
@@ -3889,7 +3890,7 @@
                 <a:spcPct val="100000"/>
               </a:lnSpc>
             </a:pPr>
-            <a:fld id="{F39DCCC8-BFBC-40C0-B298-3C4D097B5178}" type="slidenum">
+            <a:fld id="{CF84F9A3-C553-46B0-9345-803B2F987E09}" type="slidenum">
               <a:rPr b="0" lang="ru-RU" sz="900" spc="-1" strike="noStrike">
                 <a:solidFill>
                   <a:srgbClr val="8b8b8b"/>
@@ -3899,7 +3900,7 @@
               </a:rPr>
               <a:t>&lt;number&gt;</a:t>
             </a:fld>
-            <a:endParaRPr b="0" lang="en-US" sz="900" spc="-1" strike="noStrike">
+            <a:endParaRPr b="0" lang="ru-RU" sz="900" spc="-1" strike="noStrike">
               <a:latin typeface="Arial"/>
             </a:endParaRPr>
           </a:p>
@@ -3914,7 +3915,7 @@
         <p:spPr>
           <a:xfrm>
             <a:off x="3594600" y="330480"/>
-            <a:ext cx="5001480" cy="363960"/>
+            <a:ext cx="5001120" cy="363960"/>
           </a:xfrm>
           <a:prstGeom prst="rect">
             <a:avLst/>
@@ -3950,7 +3951,7 @@
               </a:rPr>
               <a:t>Взаимодействие клиент-сервер</a:t>
             </a:r>
-            <a:endParaRPr b="0" lang="en-US" sz="1800" spc="-1" strike="noStrike">
+            <a:endParaRPr b="0" lang="ru-RU" sz="1800" spc="-1" strike="noStrike">
               <a:latin typeface="Arial"/>
             </a:endParaRPr>
           </a:p>
@@ -3969,7 +3970,7 @@
         <p:spPr>
           <a:xfrm>
             <a:off x="3387960" y="1420560"/>
-            <a:ext cx="5415120" cy="4719960"/>
+            <a:ext cx="5414760" cy="4719600"/>
           </a:xfrm>
           <a:prstGeom prst="rect">
             <a:avLst/>
@@ -3988,7 +3989,7 @@
         <p:spPr>
           <a:xfrm>
             <a:off x="5162040" y="2707920"/>
-            <a:ext cx="573840" cy="302760"/>
+            <a:ext cx="573480" cy="302760"/>
           </a:xfrm>
           <a:prstGeom prst="rect">
             <a:avLst/>
@@ -4024,7 +4025,7 @@
               </a:rPr>
               <a:t>TCP</a:t>
             </a:r>
-            <a:endParaRPr b="0" lang="en-US" sz="1400" spc="-1" strike="noStrike">
+            <a:endParaRPr b="0" lang="ru-RU" sz="1400" spc="-1" strike="noStrike">
               <a:latin typeface="Arial"/>
             </a:endParaRPr>
           </a:p>
@@ -4039,7 +4040,7 @@
         <p:spPr>
           <a:xfrm>
             <a:off x="6028200" y="2694960"/>
-            <a:ext cx="573840" cy="302760"/>
+            <a:ext cx="573480" cy="302760"/>
           </a:xfrm>
           <a:prstGeom prst="rect">
             <a:avLst/>
@@ -4075,7 +4076,7 @@
               </a:rPr>
               <a:t>TCP</a:t>
             </a:r>
-            <a:endParaRPr b="0" lang="en-US" sz="1400" spc="-1" strike="noStrike">
+            <a:endParaRPr b="0" lang="ru-RU" sz="1400" spc="-1" strike="noStrike">
               <a:latin typeface="Arial"/>
             </a:endParaRPr>
           </a:p>
@@ -4090,7 +4091,7 @@
         <p:spPr>
           <a:xfrm>
             <a:off x="6771600" y="2954520"/>
-            <a:ext cx="573840" cy="302760"/>
+            <a:ext cx="573480" cy="302760"/>
           </a:xfrm>
           <a:prstGeom prst="rect">
             <a:avLst/>
@@ -4126,7 +4127,7 @@
               </a:rPr>
               <a:t>TCP</a:t>
             </a:r>
-            <a:endParaRPr b="0" lang="en-US" sz="1400" spc="-1" strike="noStrike">
+            <a:endParaRPr b="0" lang="ru-RU" sz="1400" spc="-1" strike="noStrike">
               <a:latin typeface="Arial"/>
             </a:endParaRPr>
           </a:p>
@@ -4141,7 +4142,7 @@
         <p:spPr>
           <a:xfrm>
             <a:off x="4883760" y="3373560"/>
-            <a:ext cx="573840" cy="302760"/>
+            <a:ext cx="573480" cy="302760"/>
           </a:xfrm>
           <a:prstGeom prst="rect">
             <a:avLst/>
@@ -4177,7 +4178,7 @@
               </a:rPr>
               <a:t>TCP</a:t>
             </a:r>
-            <a:endParaRPr b="0" lang="en-US" sz="1400" spc="-1" strike="noStrike">
+            <a:endParaRPr b="0" lang="ru-RU" sz="1400" spc="-1" strike="noStrike">
               <a:latin typeface="Arial"/>
             </a:endParaRPr>
           </a:p>
@@ -4192,7 +4193,7 @@
         <p:spPr>
           <a:xfrm>
             <a:off x="4866120" y="4075560"/>
-            <a:ext cx="573840" cy="302760"/>
+            <a:ext cx="573480" cy="302760"/>
           </a:xfrm>
           <a:prstGeom prst="rect">
             <a:avLst/>
@@ -4228,7 +4229,7 @@
               </a:rPr>
               <a:t>TCP</a:t>
             </a:r>
-            <a:endParaRPr b="0" lang="en-US" sz="1400" spc="-1" strike="noStrike">
+            <a:endParaRPr b="0" lang="ru-RU" sz="1400" spc="-1" strike="noStrike">
               <a:latin typeface="Arial"/>
             </a:endParaRPr>
           </a:p>
@@ -4243,7 +4244,7 @@
         <p:spPr>
           <a:xfrm>
             <a:off x="5650560" y="4347000"/>
-            <a:ext cx="573840" cy="302760"/>
+            <a:ext cx="573480" cy="302760"/>
           </a:xfrm>
           <a:prstGeom prst="rect">
             <a:avLst/>
@@ -4279,7 +4280,7 @@
               </a:rPr>
               <a:t>TCP</a:t>
             </a:r>
-            <a:endParaRPr b="0" lang="en-US" sz="1400" spc="-1" strike="noStrike">
+            <a:endParaRPr b="0" lang="ru-RU" sz="1400" spc="-1" strike="noStrike">
               <a:latin typeface="Arial"/>
             </a:endParaRPr>
           </a:p>
@@ -4294,7 +4295,7 @@
         <p:spPr>
           <a:xfrm>
             <a:off x="6512040" y="4329000"/>
-            <a:ext cx="573840" cy="302760"/>
+            <a:ext cx="573480" cy="302760"/>
           </a:xfrm>
           <a:prstGeom prst="rect">
             <a:avLst/>
@@ -4330,7 +4331,7 @@
               </a:rPr>
               <a:t>TCP</a:t>
             </a:r>
-            <a:endParaRPr b="0" lang="en-US" sz="1400" spc="-1" strike="noStrike">
+            <a:endParaRPr b="0" lang="ru-RU" sz="1400" spc="-1" strike="noStrike">
               <a:latin typeface="Arial"/>
             </a:endParaRPr>
           </a:p>
@@ -4345,7 +4346,7 @@
         <p:spPr>
           <a:xfrm>
             <a:off x="6753600" y="3656520"/>
-            <a:ext cx="573840" cy="302760"/>
+            <a:ext cx="573480" cy="302760"/>
           </a:xfrm>
           <a:prstGeom prst="rect">
             <a:avLst/>
@@ -4381,7 +4382,7 @@
               </a:rPr>
               <a:t>TCP</a:t>
             </a:r>
-            <a:endParaRPr b="0" lang="en-US" sz="1400" spc="-1" strike="noStrike">
+            <a:endParaRPr b="0" lang="ru-RU" sz="1400" spc="-1" strike="noStrike">
               <a:latin typeface="Arial"/>
             </a:endParaRPr>
           </a:p>
@@ -4400,7 +4401,7 @@
         <p:spPr>
           <a:xfrm>
             <a:off x="4687560" y="5920920"/>
-            <a:ext cx="2255040" cy="178920"/>
+            <a:ext cx="2254680" cy="178560"/>
           </a:xfrm>
           <a:prstGeom prst="rect">
             <a:avLst/>
@@ -4449,7 +4450,7 @@
         <p:spPr>
           <a:xfrm>
             <a:off x="5536440" y="6356520"/>
-            <a:ext cx="986400" cy="363960"/>
+            <a:ext cx="986040" cy="363600"/>
           </a:xfrm>
           <a:prstGeom prst="rect">
             <a:avLst/>
@@ -4475,7 +4476,7 @@
                 <a:spcPct val="100000"/>
               </a:lnSpc>
             </a:pPr>
-            <a:fld id="{8B28449F-C1B3-4824-AABB-A47E01E2B94F}" type="slidenum">
+            <a:fld id="{AB810745-8F7C-4E37-9FBF-F20F627BF3F6}" type="slidenum">
               <a:rPr b="0" lang="ru-RU" sz="900" spc="-1" strike="noStrike">
                 <a:solidFill>
                   <a:srgbClr val="8b8b8b"/>
@@ -4485,7 +4486,7 @@
               </a:rPr>
               <a:t>&lt;number&gt;</a:t>
             </a:fld>
-            <a:endParaRPr b="0" lang="en-US" sz="900" spc="-1" strike="noStrike">
+            <a:endParaRPr b="0" lang="ru-RU" sz="900" spc="-1" strike="noStrike">
               <a:latin typeface="Arial"/>
             </a:endParaRPr>
           </a:p>
@@ -4504,7 +4505,7 @@
         <p:spPr>
           <a:xfrm>
             <a:off x="8137080" y="1722240"/>
-            <a:ext cx="1408680" cy="1408680"/>
+            <a:ext cx="1408320" cy="1408320"/>
           </a:xfrm>
           <a:prstGeom prst="rect">
             <a:avLst/>
@@ -4523,7 +4524,7 @@
         <p:spPr>
           <a:xfrm>
             <a:off x="8094600" y="3054960"/>
-            <a:ext cx="1451160" cy="302760"/>
+            <a:ext cx="1450800" cy="302760"/>
           </a:xfrm>
           <a:prstGeom prst="rect">
             <a:avLst/>
@@ -4559,7 +4560,7 @@
               </a:rPr>
               <a:t>QSqlDatabase </a:t>
             </a:r>
-            <a:endParaRPr b="0" lang="en-US" sz="1400" spc="-1" strike="noStrike">
+            <a:endParaRPr b="0" lang="ru-RU" sz="1400" spc="-1" strike="noStrike">
               <a:latin typeface="Arial"/>
             </a:endParaRPr>
           </a:p>
@@ -4578,7 +4579,7 @@
         <p:spPr>
           <a:xfrm>
             <a:off x="7765200" y="1352880"/>
-            <a:ext cx="2170800" cy="398880"/>
+            <a:ext cx="2170440" cy="398520"/>
           </a:xfrm>
           <a:prstGeom prst="rect">
             <a:avLst/>
@@ -4601,7 +4602,7 @@
         <p:spPr>
           <a:xfrm>
             <a:off x="2785320" y="4401000"/>
-            <a:ext cx="7762320" cy="1853640"/>
+            <a:ext cx="7761960" cy="1853280"/>
           </a:xfrm>
           <a:prstGeom prst="rect">
             <a:avLst/>
@@ -4624,7 +4625,7 @@
         <p:spPr>
           <a:xfrm>
             <a:off x="2954520" y="1190160"/>
-            <a:ext cx="2448000" cy="2721960"/>
+            <a:ext cx="2447640" cy="2721600"/>
           </a:xfrm>
           <a:prstGeom prst="rect">
             <a:avLst/>
@@ -4643,7 +4644,7 @@
         <p:spPr>
           <a:xfrm>
             <a:off x="3594600" y="353880"/>
-            <a:ext cx="5001480" cy="363960"/>
+            <a:ext cx="5001120" cy="363960"/>
           </a:xfrm>
           <a:prstGeom prst="rect">
             <a:avLst/>
@@ -4679,7 +4680,7 @@
               </a:rPr>
               <a:t>Используемые технологии</a:t>
             </a:r>
-            <a:endParaRPr b="0" lang="en-US" sz="1800" spc="-1" strike="noStrike">
+            <a:endParaRPr b="0" lang="ru-RU" sz="1800" spc="-1" strike="noStrike">
               <a:latin typeface="Arial"/>
             </a:endParaRPr>
           </a:p>
@@ -4698,7 +4699,7 @@
         <p:spPr>
           <a:xfrm>
             <a:off x="318600" y="280800"/>
-            <a:ext cx="2481480" cy="1198800"/>
+            <a:ext cx="2481120" cy="1198440"/>
           </a:xfrm>
           <a:prstGeom prst="rect">
             <a:avLst/>
@@ -4747,7 +4748,7 @@
         <p:spPr>
           <a:xfrm>
             <a:off x="5536440" y="6356520"/>
-            <a:ext cx="986400" cy="363960"/>
+            <a:ext cx="986040" cy="363600"/>
           </a:xfrm>
           <a:prstGeom prst="rect">
             <a:avLst/>
@@ -4773,7 +4774,7 @@
                 <a:spcPct val="100000"/>
               </a:lnSpc>
             </a:pPr>
-            <a:fld id="{874B053E-5341-4EDA-8C73-01B998C490A2}" type="slidenum">
+            <a:fld id="{B4651914-102F-4248-B19E-278C16140571}" type="slidenum">
               <a:rPr b="0" lang="ru-RU" sz="900" spc="-1" strike="noStrike">
                 <a:solidFill>
                   <a:srgbClr val="8b8b8b"/>
@@ -4783,7 +4784,7 @@
               </a:rPr>
               <a:t>&lt;number&gt;</a:t>
             </a:fld>
-            <a:endParaRPr b="0" lang="en-US" sz="900" spc="-1" strike="noStrike">
+            <a:endParaRPr b="0" lang="ru-RU" sz="900" spc="-1" strike="noStrike">
               <a:latin typeface="Arial"/>
             </a:endParaRPr>
           </a:p>
@@ -4802,7 +4803,7 @@
         <p:spPr>
           <a:xfrm>
             <a:off x="2356920" y="757800"/>
-            <a:ext cx="7477200" cy="5341680"/>
+            <a:ext cx="7476840" cy="5341320"/>
           </a:xfrm>
           <a:prstGeom prst="rect">
             <a:avLst/>
@@ -4821,7 +4822,7 @@
         <p:spPr>
           <a:xfrm>
             <a:off x="3594600" y="353880"/>
-            <a:ext cx="5001480" cy="363960"/>
+            <a:ext cx="5001120" cy="363960"/>
           </a:xfrm>
           <a:prstGeom prst="rect">
             <a:avLst/>
@@ -4857,7 +4858,7 @@
               </a:rPr>
               <a:t>Архитектура БД</a:t>
             </a:r>
-            <a:endParaRPr b="0" lang="en-US" sz="1800" spc="-1" strike="noStrike">
+            <a:endParaRPr b="0" lang="ru-RU" sz="1800" spc="-1" strike="noStrike">
               <a:latin typeface="Arial"/>
             </a:endParaRPr>
           </a:p>
@@ -4902,7 +4903,7 @@
         <p:spPr>
           <a:xfrm>
             <a:off x="5536440" y="6356520"/>
-            <a:ext cx="986400" cy="363960"/>
+            <a:ext cx="986040" cy="363600"/>
           </a:xfrm>
           <a:prstGeom prst="rect">
             <a:avLst/>
@@ -4928,7 +4929,7 @@
                 <a:spcPct val="100000"/>
               </a:lnSpc>
             </a:pPr>
-            <a:fld id="{379274C8-CB9A-4581-B14D-B8593BEE5972}" type="slidenum">
+            <a:fld id="{BC159228-29A8-4C2A-BB35-169E117E42F4}" type="slidenum">
               <a:rPr b="0" lang="ru-RU" sz="900" spc="-1" strike="noStrike">
                 <a:solidFill>
                   <a:srgbClr val="8b8b8b"/>
@@ -4938,7 +4939,7 @@
               </a:rPr>
               <a:t>&lt;number&gt;</a:t>
             </a:fld>
-            <a:endParaRPr b="0" lang="en-US" sz="900" spc="-1" strike="noStrike">
+            <a:endParaRPr b="0" lang="ru-RU" sz="900" spc="-1" strike="noStrike">
               <a:latin typeface="Arial"/>
             </a:endParaRPr>
           </a:p>
@@ -4953,7 +4954,7 @@
         <p:spPr>
           <a:xfrm>
             <a:off x="3594600" y="353880"/>
-            <a:ext cx="5001480" cy="363960"/>
+            <a:ext cx="5001120" cy="363960"/>
           </a:xfrm>
           <a:prstGeom prst="rect">
             <a:avLst/>
@@ -4989,7 +4990,7 @@
               </a:rPr>
               <a:t>Дальнейшее развитие</a:t>
             </a:r>
-            <a:endParaRPr b="0" lang="en-US" sz="1800" spc="-1" strike="noStrike">
+            <a:endParaRPr b="0" lang="ru-RU" sz="1800" spc="-1" strike="noStrike">
               <a:latin typeface="Arial"/>
             </a:endParaRPr>
           </a:p>
@@ -5004,7 +5005,7 @@
         <p:spPr>
           <a:xfrm>
             <a:off x="107280" y="2630160"/>
-            <a:ext cx="5496120" cy="2009880"/>
+            <a:ext cx="5495760" cy="2009880"/>
           </a:xfrm>
           <a:prstGeom prst="rect">
             <a:avLst/>
@@ -5025,7 +5026,7 @@
             <a:spAutoFit/>
           </a:bodyPr>
           <a:p>
-            <a:pPr marL="285840" indent="-284760" algn="ctr">
+            <a:pPr marL="285840" indent="-284400" algn="ctr">
               <a:lnSpc>
                 <a:spcPct val="100000"/>
               </a:lnSpc>
@@ -5055,12 +5056,12 @@
               </a:rPr>
               <a:t>наше всё</a:t>
             </a:r>
-            <a:endParaRPr b="0" lang="en-US" sz="1800" spc="-1" strike="noStrike">
-              <a:latin typeface="Arial"/>
-            </a:endParaRPr>
-          </a:p>
-          <a:p>
-            <a:pPr marL="285840" indent="-284760" algn="ctr">
+            <a:endParaRPr b="0" lang="ru-RU" sz="1800" spc="-1" strike="noStrike">
+              <a:latin typeface="Arial"/>
+            </a:endParaRPr>
+          </a:p>
+          <a:p>
+            <a:pPr marL="285840" indent="-284400" algn="ctr">
               <a:lnSpc>
                 <a:spcPct val="100000"/>
               </a:lnSpc>
@@ -5080,12 +5081,12 @@
               </a:rPr>
               <a:t>Больше прав администраторам!</a:t>
             </a:r>
-            <a:endParaRPr b="0" lang="en-US" sz="1800" spc="-1" strike="noStrike">
-              <a:latin typeface="Arial"/>
-            </a:endParaRPr>
-          </a:p>
-          <a:p>
-            <a:pPr marL="285840" indent="-284760" algn="ctr">
+            <a:endParaRPr b="0" lang="ru-RU" sz="1800" spc="-1" strike="noStrike">
+              <a:latin typeface="Arial"/>
+            </a:endParaRPr>
+          </a:p>
+          <a:p>
+            <a:pPr marL="285840" indent="-284400" algn="ctr">
               <a:lnSpc>
                 <a:spcPct val="100000"/>
               </a:lnSpc>
@@ -5125,12 +5126,12 @@
               </a:rPr>
               <a:t>но..</a:t>
             </a:r>
-            <a:endParaRPr b="0" lang="en-US" sz="1800" spc="-1" strike="noStrike">
-              <a:latin typeface="Arial"/>
-            </a:endParaRPr>
-          </a:p>
-          <a:p>
-            <a:pPr marL="285840" indent="-284760" algn="ctr">
+            <a:endParaRPr b="0" lang="ru-RU" sz="1800" spc="-1" strike="noStrike">
+              <a:latin typeface="Arial"/>
+            </a:endParaRPr>
+          </a:p>
+          <a:p>
+            <a:pPr marL="285840" indent="-284400" algn="ctr">
               <a:lnSpc>
                 <a:spcPct val="100000"/>
               </a:lnSpc>
@@ -5150,12 +5151,12 @@
               </a:rPr>
               <a:t>А как же изменение сообщений и передача файлов?</a:t>
             </a:r>
-            <a:endParaRPr b="0" lang="en-US" sz="1800" spc="-1" strike="noStrike">
-              <a:latin typeface="Arial"/>
-            </a:endParaRPr>
-          </a:p>
-          <a:p>
-            <a:pPr marL="285840" indent="-284760" algn="ctr">
+            <a:endParaRPr b="0" lang="ru-RU" sz="1800" spc="-1" strike="noStrike">
+              <a:latin typeface="Arial"/>
+            </a:endParaRPr>
+          </a:p>
+          <a:p>
+            <a:pPr marL="285840" indent="-284400" algn="ctr">
               <a:lnSpc>
                 <a:spcPct val="100000"/>
               </a:lnSpc>
@@ -5175,12 +5176,12 @@
               </a:rPr>
               <a:t>Свой маленький Skynet. Why not?</a:t>
             </a:r>
-            <a:endParaRPr b="0" lang="en-US" sz="1800" spc="-1" strike="noStrike">
-              <a:latin typeface="Arial"/>
-            </a:endParaRPr>
-          </a:p>
-          <a:p>
-            <a:pPr marL="285840" indent="-284760" algn="ctr">
+            <a:endParaRPr b="0" lang="ru-RU" sz="1800" spc="-1" strike="noStrike">
+              <a:latin typeface="Arial"/>
+            </a:endParaRPr>
+          </a:p>
+          <a:p>
+            <a:pPr marL="285840" indent="-284400" algn="ctr">
               <a:lnSpc>
                 <a:spcPct val="100000"/>
               </a:lnSpc>
@@ -5198,9 +5199,9 @@
                 <a:latin typeface="Times New Roman"/>
                 <a:ea typeface="DejaVu Sans"/>
               </a:rPr>
-              <a:t>Message Digest hash? Дайте 5!</a:t>
+              <a:t>Message Digest Hash? Дайте 5!</a:t>
             </a:r>
-            <a:endParaRPr b="0" lang="en-US" sz="1800" spc="-1" strike="noStrike">
+            <a:endParaRPr b="0" lang="ru-RU" sz="1800" spc="-1" strike="noStrike">
               <a:latin typeface="Arial"/>
             </a:endParaRPr>
           </a:p>

</xml_diff>